<commit_message>
add jfa scheme picture to presentation
</commit_message>
<xml_diff>
--- a/VisProPresentation.pptx
+++ b/VisProPresentation.pptx
@@ -5,10 +5,10 @@
     <p:sldMasterId id="2147483660" r:id="rId1"/>
   </p:sldMasterIdLst>
   <p:notesMasterIdLst>
-    <p:notesMasterId r:id="rId8"/>
+    <p:notesMasterId r:id="rId9"/>
   </p:notesMasterIdLst>
   <p:handoutMasterIdLst>
-    <p:handoutMasterId r:id="rId9"/>
+    <p:handoutMasterId r:id="rId10"/>
   </p:handoutMasterIdLst>
   <p:sldIdLst>
     <p:sldId id="260" r:id="rId2"/>
@@ -17,11 +17,12 @@
     <p:sldId id="264" r:id="rId5"/>
     <p:sldId id="267" r:id="rId6"/>
     <p:sldId id="265" r:id="rId7"/>
+    <p:sldId id="268" r:id="rId8"/>
   </p:sldIdLst>
   <p:sldSz cx="9144000" cy="6858000" type="screen4x3"/>
   <p:notesSz cx="7099300" cy="10234613"/>
   <p:custDataLst>
-    <p:tags r:id="rId10"/>
+    <p:tags r:id="rId11"/>
   </p:custDataLst>
   <p:kinsoku lang="ja-JP" invalStChars="、。，．・：；？！゛゜ヽヾゝゞ々ー’”）〕］｝〉》」』】°‰′″℃￠％ぁぃぅぇぉっゃゅょゎァィゥェォッャュョヮヵヶ!%),.:;?]}｡｣､･ｧｨｩｪｫｬｭｮｯｰﾞﾟ" invalEndChars="‘“（〔［｛〈《「『【￥＄$([\{｢￡"/>
   <p:defaultTextStyle>
@@ -20385,6 +20386,13 @@
   <p:clrMapOvr>
     <a:masterClrMapping/>
   </p:clrMapOvr>
+  <p:timing>
+    <p:tnLst>
+      <p:par>
+        <p:cTn id="1" dur="indefinite" restart="never" nodeType="tmRoot"/>
+      </p:par>
+    </p:tnLst>
+  </p:timing>
 </p:sld>
 </file>
 
@@ -20448,7 +20456,6 @@
               <a:rPr lang="en-US" dirty="0" smtClean="0"/>
               <a:t>C++ </a:t>
             </a:r>
-            <a:endParaRPr lang="en-US" dirty="0" smtClean="0"/>
           </a:p>
           <a:p>
             <a:pPr eaLnBrk="1" hangingPunct="1"/>
@@ -20468,19 +20475,7 @@
             <a:pPr lvl="1" eaLnBrk="1" hangingPunct="1"/>
             <a:r>
               <a:rPr lang="en-US" dirty="0" smtClean="0"/>
-              <a:t>1</a:t>
-            </a:r>
-            <a:r>
-              <a:rPr lang="en-US" dirty="0" smtClean="0"/>
-              <a:t>. </a:t>
-            </a:r>
-            <a:r>
-              <a:rPr lang="en-US" dirty="0" smtClean="0"/>
-              <a:t>Initial </a:t>
-            </a:r>
-            <a:r>
-              <a:rPr lang="en-US" dirty="0" smtClean="0"/>
-              <a:t>depth map</a:t>
+              <a:t>1. Initial depth map</a:t>
             </a:r>
           </a:p>
           <a:p>
@@ -20760,40 +20755,6 @@
             <a:endParaRPr lang="de-DE" dirty="0" smtClean="0"/>
           </a:p>
           <a:p>
-            <a:r>
-              <a:rPr lang="de-DE" dirty="0" err="1" smtClean="0"/>
-              <a:t>Perspective</a:t>
-            </a:r>
-            <a:r>
-              <a:rPr lang="de-DE" dirty="0" smtClean="0"/>
-              <a:t> </a:t>
-            </a:r>
-            <a:r>
-              <a:rPr lang="de-DE" dirty="0" err="1" smtClean="0"/>
-              <a:t>compensation</a:t>
-            </a:r>
-            <a:r>
-              <a:rPr lang="de-DE" dirty="0" smtClean="0"/>
-              <a:t>: </a:t>
-            </a:r>
-            <a:r>
-              <a:rPr lang="de-DE" dirty="0" err="1" smtClean="0"/>
-              <a:t>Adapt</a:t>
-            </a:r>
-            <a:r>
-              <a:rPr lang="de-DE" dirty="0" smtClean="0"/>
-              <a:t> </a:t>
-            </a:r>
-            <a:r>
-              <a:rPr lang="de-DE" dirty="0" err="1" smtClean="0"/>
-              <a:t>slope</a:t>
-            </a:r>
-            <a:r>
-              <a:rPr lang="de-DE" dirty="0" smtClean="0"/>
-              <a:t> m</a:t>
-            </a:r>
-          </a:p>
-          <a:p>
             <a:pPr marL="0" indent="0">
               <a:buNone/>
             </a:pPr>
@@ -20827,6 +20788,36 @@
           </a:p>
         </p:txBody>
       </p:sp>
+      <p:pic>
+        <p:nvPicPr>
+          <p:cNvPr id="5" name="Grafik 4"/>
+          <p:cNvPicPr>
+            <a:picLocks noChangeAspect="1"/>
+          </p:cNvPicPr>
+          <p:nvPr/>
+        </p:nvPicPr>
+        <p:blipFill>
+          <a:blip r:embed="rId2">
+            <a:extLst>
+              <a:ext uri="{28A0092B-C50C-407E-A947-70E740481C1C}">
+                <a14:useLocalDpi xmlns:a14="http://schemas.microsoft.com/office/drawing/2010/main" val="0"/>
+              </a:ext>
+            </a:extLst>
+          </a:blip>
+          <a:stretch>
+            <a:fillRect/>
+          </a:stretch>
+        </p:blipFill>
+        <p:spPr>
+          <a:xfrm>
+            <a:off x="992536" y="5012186"/>
+            <a:ext cx="7158929" cy="1441150"/>
+          </a:xfrm>
+          <a:prstGeom prst="rect">
+            <a:avLst/>
+          </a:prstGeom>
+        </p:spPr>
+      </p:pic>
     </p:spTree>
     <p:extLst>
       <p:ext uri="{BB962C8B-B14F-4D97-AF65-F5344CB8AC3E}">
@@ -20837,6 +20828,13 @@
   <p:clrMapOvr>
     <a:masterClrMapping/>
   </p:clrMapOvr>
+  <p:timing>
+    <p:tnLst>
+      <p:par>
+        <p:cTn id="1" dur="indefinite" restart="never" nodeType="tmRoot"/>
+      </p:par>
+    </p:tnLst>
+  </p:timing>
 </p:sld>
 </file>
 
@@ -21096,6 +21094,162 @@
       </p:par>
     </p:tnLst>
   </p:timing>
+</p:sld>
+</file>
+
+<file path=ppt/slides/slide7.xml><?xml version="1.0" encoding="utf-8"?>
+<p:sld xmlns:a="http://schemas.openxmlformats.org/drawingml/2006/main" xmlns:r="http://schemas.openxmlformats.org/officeDocument/2006/relationships" xmlns:p="http://schemas.openxmlformats.org/presentationml/2006/main">
+  <p:cSld>
+    <p:spTree>
+      <p:nvGrpSpPr>
+        <p:cNvPr id="1" name=""/>
+        <p:cNvGrpSpPr/>
+        <p:nvPr/>
+      </p:nvGrpSpPr>
+      <p:grpSpPr>
+        <a:xfrm>
+          <a:off x="0" y="0"/>
+          <a:ext cx="0" cy="0"/>
+          <a:chOff x="0" y="0"/>
+          <a:chExt cx="0" cy="0"/>
+        </a:xfrm>
+      </p:grpSpPr>
+      <p:sp>
+        <p:nvSpPr>
+          <p:cNvPr id="2" name="Titel 1"/>
+          <p:cNvSpPr>
+            <a:spLocks noGrp="1"/>
+          </p:cNvSpPr>
+          <p:nvPr>
+            <p:ph type="title"/>
+          </p:nvPr>
+        </p:nvSpPr>
+        <p:spPr/>
+        <p:txBody>
+          <a:bodyPr/>
+          <a:lstStyle/>
+          <a:p>
+            <a:r>
+              <a:rPr lang="de-DE" dirty="0" smtClean="0"/>
+              <a:t>References</a:t>
+            </a:r>
+            <a:endParaRPr lang="de-DE" dirty="0"/>
+          </a:p>
+        </p:txBody>
+      </p:sp>
+      <p:sp>
+        <p:nvSpPr>
+          <p:cNvPr id="3" name="Inhaltsplatzhalter 2"/>
+          <p:cNvSpPr>
+            <a:spLocks noGrp="1"/>
+          </p:cNvSpPr>
+          <p:nvPr>
+            <p:ph idx="1"/>
+          </p:nvPr>
+        </p:nvSpPr>
+        <p:spPr/>
+        <p:txBody>
+          <a:bodyPr/>
+          <a:lstStyle/>
+          <a:p>
+            <a:r>
+              <a:rPr lang="de-DE" i="1" dirty="0" smtClean="0"/>
+              <a:t>Adaptive </a:t>
+            </a:r>
+            <a:r>
+              <a:rPr lang="de-DE" i="1" dirty="0" err="1" smtClean="0"/>
+              <a:t>Cutaways</a:t>
+            </a:r>
+            <a:r>
+              <a:rPr lang="de-DE" i="1" dirty="0" smtClean="0"/>
+              <a:t> </a:t>
+            </a:r>
+            <a:r>
+              <a:rPr lang="en-US" i="1" dirty="0"/>
+              <a:t>for Comprehensible Rendering of Polygonal Scenes </a:t>
+            </a:r>
+            <a:r>
+              <a:rPr lang="de-DE" dirty="0" smtClean="0"/>
+              <a:t>[Burns + Finkelstein, 2012]</a:t>
+            </a:r>
+          </a:p>
+          <a:p>
+            <a:r>
+              <a:rPr lang="en-US" i="1" dirty="0"/>
+              <a:t>Jump Flooding in GPU with Applications to </a:t>
+            </a:r>
+            <a:r>
+              <a:rPr lang="en-US" i="1" dirty="0" err="1"/>
+              <a:t>Voronoi</a:t>
+            </a:r>
+            <a:r>
+              <a:rPr lang="en-US" i="1" dirty="0"/>
+              <a:t> Diagram and Distance </a:t>
+            </a:r>
+            <a:r>
+              <a:rPr lang="en-US" i="1" dirty="0" smtClean="0"/>
+              <a:t>Transform </a:t>
+            </a:r>
+            <a:r>
+              <a:rPr lang="de-DE" dirty="0" smtClean="0"/>
+              <a:t>[</a:t>
+            </a:r>
+            <a:r>
+              <a:rPr lang="de-DE" dirty="0" err="1" smtClean="0"/>
+              <a:t>Rong</a:t>
+            </a:r>
+            <a:r>
+              <a:rPr lang="de-DE" dirty="0" smtClean="0"/>
+              <a:t> </a:t>
+            </a:r>
+            <a:r>
+              <a:rPr lang="de-DE" dirty="0" err="1"/>
+              <a:t>and</a:t>
+            </a:r>
+            <a:r>
+              <a:rPr lang="de-DE" dirty="0"/>
+              <a:t> Tan 2006]</a:t>
+            </a:r>
+            <a:endParaRPr lang="de-DE" dirty="0"/>
+          </a:p>
+        </p:txBody>
+      </p:sp>
+      <p:sp>
+        <p:nvSpPr>
+          <p:cNvPr id="4" name="Fußzeilenplatzhalter 3"/>
+          <p:cNvSpPr>
+            <a:spLocks noGrp="1"/>
+          </p:cNvSpPr>
+          <p:nvPr>
+            <p:ph type="ftr" sz="quarter" idx="10"/>
+          </p:nvPr>
+        </p:nvSpPr>
+        <p:spPr/>
+        <p:txBody>
+          <a:bodyPr/>
+          <a:lstStyle/>
+          <a:p>
+            <a:pPr>
+              <a:defRPr/>
+            </a:pPr>
+            <a:r>
+              <a:rPr lang="de-AT" smtClean="0"/>
+              <a:t>Christian Brändle and Hanna Huber</a:t>
+            </a:r>
+            <a:endParaRPr lang="de-AT" dirty="0"/>
+          </a:p>
+        </p:txBody>
+      </p:sp>
+    </p:spTree>
+    <p:extLst>
+      <p:ext uri="{BB962C8B-B14F-4D97-AF65-F5344CB8AC3E}">
+        <p14:creationId xmlns:p14="http://schemas.microsoft.com/office/powerpoint/2010/main" val="2186951328"/>
+      </p:ext>
+    </p:extLst>
+  </p:cSld>
+  <p:clrMapOvr>
+    <a:masterClrMapping/>
+  </p:clrMapOvr>
 </p:sld>
 </file>
 

</xml_diff>

<commit_message>
add imgs to pres: scene+ztex+cutaway
</commit_message>
<xml_diff>
--- a/VisProPresentation.pptx
+++ b/VisProPresentation.pptx
@@ -20520,6 +20520,96 @@
           </a:p>
         </p:txBody>
       </p:sp>
+      <p:pic>
+        <p:nvPicPr>
+          <p:cNvPr id="2" name="Grafik 1"/>
+          <p:cNvPicPr>
+            <a:picLocks noChangeAspect="1"/>
+          </p:cNvPicPr>
+          <p:nvPr/>
+        </p:nvPicPr>
+        <p:blipFill>
+          <a:blip r:embed="rId2" cstate="print">
+            <a:extLst>
+              <a:ext uri="{28A0092B-C50C-407E-A947-70E740481C1C}">
+                <a14:useLocalDpi xmlns:a14="http://schemas.microsoft.com/office/drawing/2010/main" val="0"/>
+              </a:ext>
+            </a:extLst>
+          </a:blip>
+          <a:stretch>
+            <a:fillRect/>
+          </a:stretch>
+        </p:blipFill>
+        <p:spPr>
+          <a:xfrm>
+            <a:off x="539552" y="4399716"/>
+            <a:ext cx="2448272" cy="1909604"/>
+          </a:xfrm>
+          <a:prstGeom prst="rect">
+            <a:avLst/>
+          </a:prstGeom>
+        </p:spPr>
+      </p:pic>
+      <p:pic>
+        <p:nvPicPr>
+          <p:cNvPr id="3" name="Grafik 2"/>
+          <p:cNvPicPr>
+            <a:picLocks noChangeAspect="1"/>
+          </p:cNvPicPr>
+          <p:nvPr/>
+        </p:nvPicPr>
+        <p:blipFill>
+          <a:blip r:embed="rId3" cstate="print">
+            <a:extLst>
+              <a:ext uri="{28A0092B-C50C-407E-A947-70E740481C1C}">
+                <a14:useLocalDpi xmlns:a14="http://schemas.microsoft.com/office/drawing/2010/main" val="0"/>
+              </a:ext>
+            </a:extLst>
+          </a:blip>
+          <a:stretch>
+            <a:fillRect/>
+          </a:stretch>
+        </p:blipFill>
+        <p:spPr>
+          <a:xfrm>
+            <a:off x="3275856" y="4401320"/>
+            <a:ext cx="2431199" cy="1908000"/>
+          </a:xfrm>
+          <a:prstGeom prst="rect">
+            <a:avLst/>
+          </a:prstGeom>
+        </p:spPr>
+      </p:pic>
+      <p:pic>
+        <p:nvPicPr>
+          <p:cNvPr id="4" name="Grafik 3"/>
+          <p:cNvPicPr>
+            <a:picLocks noChangeAspect="1"/>
+          </p:cNvPicPr>
+          <p:nvPr/>
+        </p:nvPicPr>
+        <p:blipFill>
+          <a:blip r:embed="rId4" cstate="print">
+            <a:extLst>
+              <a:ext uri="{28A0092B-C50C-407E-A947-70E740481C1C}">
+                <a14:useLocalDpi xmlns:a14="http://schemas.microsoft.com/office/drawing/2010/main" val="0"/>
+              </a:ext>
+            </a:extLst>
+          </a:blip>
+          <a:stretch>
+            <a:fillRect/>
+          </a:stretch>
+        </p:blipFill>
+        <p:spPr>
+          <a:xfrm>
+            <a:off x="6012160" y="4401320"/>
+            <a:ext cx="2438670" cy="1908000"/>
+          </a:xfrm>
+          <a:prstGeom prst="rect">
+            <a:avLst/>
+          </a:prstGeom>
+        </p:spPr>
+      </p:pic>
     </p:spTree>
     <p:extLst>
       <p:ext uri="{BB962C8B-B14F-4D97-AF65-F5344CB8AC3E}">
@@ -21210,7 +21300,6 @@
               <a:rPr lang="de-DE" dirty="0"/>
               <a:t> Tan 2006]</a:t>
             </a:r>
-            <a:endParaRPr lang="de-DE" dirty="0"/>
           </a:p>
         </p:txBody>
       </p:sp>

</xml_diff>